<commit_message>
latest PPT added and docs converted to PDF
</commit_message>
<xml_diff>
--- a/PCS24-12-AditiBatra/PPT/PPT2_PCS24-12.pptx
+++ b/PCS24-12-AditiBatra/PPT/PPT2_PCS24-12.pptx
@@ -5,7 +5,7 @@
     <p:sldMasterId id="2147483648" r:id="rId1"/>
   </p:sldMasterIdLst>
   <p:notesMasterIdLst>
-    <p:notesMasterId r:id="rId18"/>
+    <p:notesMasterId r:id="rId20"/>
   </p:notesMasterIdLst>
   <p:sldIdLst>
     <p:sldId id="256" r:id="rId2"/>
@@ -18,12 +18,14 @@
     <p:sldId id="267" r:id="rId9"/>
     <p:sldId id="262" r:id="rId10"/>
     <p:sldId id="263" r:id="rId11"/>
-    <p:sldId id="270" r:id="rId12"/>
-    <p:sldId id="271" r:id="rId13"/>
-    <p:sldId id="272" r:id="rId14"/>
-    <p:sldId id="273" r:id="rId15"/>
-    <p:sldId id="274" r:id="rId16"/>
-    <p:sldId id="276" r:id="rId17"/>
+    <p:sldId id="291" r:id="rId12"/>
+    <p:sldId id="270" r:id="rId13"/>
+    <p:sldId id="271" r:id="rId14"/>
+    <p:sldId id="272" r:id="rId15"/>
+    <p:sldId id="273" r:id="rId16"/>
+    <p:sldId id="274" r:id="rId17"/>
+    <p:sldId id="276" r:id="rId18"/>
+    <p:sldId id="292" r:id="rId19"/>
   </p:sldIdLst>
   <p:sldSz cx="12192000" cy="6858000"/>
   <p:notesSz cx="6858000" cy="9144000"/>
@@ -212,7 +214,7 @@
           <a:p>
             <a:fld id="{E13B6DE8-89EB-4910-BE6E-A1D1FF0DA414}" type="datetimeFigureOut">
               <a:rPr lang="en-IN" smtClean="0"/>
-              <a:t>06-11-2023</a:t>
+              <a:t>03-04-2024</a:t>
             </a:fld>
             <a:endParaRPr lang="en-IN"/>
           </a:p>
@@ -629,7 +631,7 @@
           <a:p>
             <a:fld id="{AED75D64-2596-4CD3-88B1-63A1A557245C}" type="datetimeFigureOut">
               <a:rPr lang="en-IN" smtClean="0"/>
-              <a:t>06-11-2023</a:t>
+              <a:t>03-04-2024</a:t>
             </a:fld>
             <a:endParaRPr lang="en-IN"/>
           </a:p>
@@ -829,7 +831,7 @@
           <a:p>
             <a:fld id="{AED75D64-2596-4CD3-88B1-63A1A557245C}" type="datetimeFigureOut">
               <a:rPr lang="en-IN" smtClean="0"/>
-              <a:t>06-11-2023</a:t>
+              <a:t>03-04-2024</a:t>
             </a:fld>
             <a:endParaRPr lang="en-IN"/>
           </a:p>
@@ -1039,7 +1041,7 @@
           <a:p>
             <a:fld id="{AED75D64-2596-4CD3-88B1-63A1A557245C}" type="datetimeFigureOut">
               <a:rPr lang="en-IN" smtClean="0"/>
-              <a:t>06-11-2023</a:t>
+              <a:t>03-04-2024</a:t>
             </a:fld>
             <a:endParaRPr lang="en-IN"/>
           </a:p>
@@ -1239,7 +1241,7 @@
           <a:p>
             <a:fld id="{AED75D64-2596-4CD3-88B1-63A1A557245C}" type="datetimeFigureOut">
               <a:rPr lang="en-IN" smtClean="0"/>
-              <a:t>06-11-2023</a:t>
+              <a:t>03-04-2024</a:t>
             </a:fld>
             <a:endParaRPr lang="en-IN"/>
           </a:p>
@@ -1515,7 +1517,7 @@
           <a:p>
             <a:fld id="{AED75D64-2596-4CD3-88B1-63A1A557245C}" type="datetimeFigureOut">
               <a:rPr lang="en-IN" smtClean="0"/>
-              <a:t>06-11-2023</a:t>
+              <a:t>03-04-2024</a:t>
             </a:fld>
             <a:endParaRPr lang="en-IN"/>
           </a:p>
@@ -1783,7 +1785,7 @@
           <a:p>
             <a:fld id="{AED75D64-2596-4CD3-88B1-63A1A557245C}" type="datetimeFigureOut">
               <a:rPr lang="en-IN" smtClean="0"/>
-              <a:t>06-11-2023</a:t>
+              <a:t>03-04-2024</a:t>
             </a:fld>
             <a:endParaRPr lang="en-IN"/>
           </a:p>
@@ -2198,7 +2200,7 @@
           <a:p>
             <a:fld id="{AED75D64-2596-4CD3-88B1-63A1A557245C}" type="datetimeFigureOut">
               <a:rPr lang="en-IN" smtClean="0"/>
-              <a:t>06-11-2023</a:t>
+              <a:t>03-04-2024</a:t>
             </a:fld>
             <a:endParaRPr lang="en-IN"/>
           </a:p>
@@ -2340,7 +2342,7 @@
           <a:p>
             <a:fld id="{AED75D64-2596-4CD3-88B1-63A1A557245C}" type="datetimeFigureOut">
               <a:rPr lang="en-IN" smtClean="0"/>
-              <a:t>06-11-2023</a:t>
+              <a:t>03-04-2024</a:t>
             </a:fld>
             <a:endParaRPr lang="en-IN"/>
           </a:p>
@@ -2453,7 +2455,7 @@
           <a:p>
             <a:fld id="{AED75D64-2596-4CD3-88B1-63A1A557245C}" type="datetimeFigureOut">
               <a:rPr lang="en-IN" smtClean="0"/>
-              <a:t>06-11-2023</a:t>
+              <a:t>03-04-2024</a:t>
             </a:fld>
             <a:endParaRPr lang="en-IN"/>
           </a:p>
@@ -2766,7 +2768,7 @@
           <a:p>
             <a:fld id="{AED75D64-2596-4CD3-88B1-63A1A557245C}" type="datetimeFigureOut">
               <a:rPr lang="en-IN" smtClean="0"/>
-              <a:t>06-11-2023</a:t>
+              <a:t>03-04-2024</a:t>
             </a:fld>
             <a:endParaRPr lang="en-IN"/>
           </a:p>
@@ -3055,7 +3057,7 @@
           <a:p>
             <a:fld id="{AED75D64-2596-4CD3-88B1-63A1A557245C}" type="datetimeFigureOut">
               <a:rPr lang="en-IN" smtClean="0"/>
-              <a:t>06-11-2023</a:t>
+              <a:t>03-04-2024</a:t>
             </a:fld>
             <a:endParaRPr lang="en-IN"/>
           </a:p>
@@ -3298,7 +3300,7 @@
           <a:p>
             <a:fld id="{AED75D64-2596-4CD3-88B1-63A1A557245C}" type="datetimeFigureOut">
               <a:rPr lang="en-IN" smtClean="0"/>
-              <a:t>06-11-2023</a:t>
+              <a:t>03-04-2024</a:t>
             </a:fld>
             <a:endParaRPr lang="en-IN"/>
           </a:p>
@@ -3780,7 +3782,7 @@
             </a:br>
             <a:r>
               <a:rPr lang="en-IN" sz="2700" dirty="0"/>
-              <a:t>(Project Presentation, KCS 753)</a:t>
+              <a:t>(Project Presentation, KCS 851)</a:t>
             </a:r>
           </a:p>
         </p:txBody>
@@ -4296,27 +4298,21 @@
           <a:p>
             <a:r>
               <a:rPr lang="en-IN" sz="3600" dirty="0"/>
-              <a:t>Research Paper Status (in progress)</a:t>
+              <a:t>Research Paper Status </a:t>
             </a:r>
             <a:br>
               <a:rPr lang="en-IN" sz="3600" dirty="0"/>
             </a:br>
-            <a:r>
-              <a:rPr lang="en-IN" sz="3600" dirty="0">
-                <a:hlinkClick r:id="rId2"/>
-              </a:rPr>
-              <a:t>link</a:t>
-            </a:r>
             <a:endParaRPr lang="en-IN" sz="3600" dirty="0"/>
           </a:p>
         </p:txBody>
       </p:sp>
       <p:pic>
         <p:nvPicPr>
-          <p:cNvPr id="8" name="Content Placeholder 7">
-            <a:extLst>
-              <a:ext uri="{FF2B5EF4-FFF2-40B4-BE49-F238E27FC236}">
-                <a16:creationId xmlns:a16="http://schemas.microsoft.com/office/drawing/2014/main" id="{52B0F4FE-E1CD-4A6F-EED6-48B6DA3B222A}"/>
+          <p:cNvPr id="6" name="Content Placeholder 5">
+            <a:extLst>
+              <a:ext uri="{FF2B5EF4-FFF2-40B4-BE49-F238E27FC236}">
+                <a16:creationId xmlns:a16="http://schemas.microsoft.com/office/drawing/2014/main" id="{6549A54C-76F1-FA08-B031-D38784A31025}"/>
               </a:ext>
             </a:extLst>
           </p:cNvPr>
@@ -4328,15 +4324,85 @@
           </p:nvPr>
         </p:nvPicPr>
         <p:blipFill rotWithShape="1">
-          <a:blip r:embed="rId3"/>
-          <a:srcRect l="11989" t="19439" b="6805"/>
+          <a:blip r:embed="rId2"/>
+          <a:srcRect l="21840" t="21706" r="25085" b="5568"/>
           <a:stretch/>
         </p:blipFill>
         <p:spPr>
           <a:xfrm>
-            <a:off x="1953376" y="1690688"/>
-            <a:ext cx="9862106" cy="4648914"/>
+            <a:off x="6757394" y="1180306"/>
+            <a:ext cx="5294690" cy="4566070"/>
           </a:xfrm>
+        </p:spPr>
+      </p:pic>
+      <p:pic>
+        <p:nvPicPr>
+          <p:cNvPr id="11" name="Picture 10">
+            <a:extLst>
+              <a:ext uri="{FF2B5EF4-FFF2-40B4-BE49-F238E27FC236}">
+                <a16:creationId xmlns:a16="http://schemas.microsoft.com/office/drawing/2014/main" id="{EED78183-AEDF-77EE-6DFF-15B4BE6F57E9}"/>
+              </a:ext>
+            </a:extLst>
+          </p:cNvPr>
+          <p:cNvPicPr>
+            <a:picLocks noChangeAspect="1"/>
+          </p:cNvPicPr>
+          <p:nvPr/>
+        </p:nvPicPr>
+        <p:blipFill rotWithShape="1">
+          <a:blip r:embed="rId3">
+            <a:extLst>
+              <a:ext uri="{28A0092B-C50C-407E-A947-70E740481C1C}">
+                <a14:useLocalDpi xmlns:a14="http://schemas.microsoft.com/office/drawing/2010/main" val="0"/>
+              </a:ext>
+            </a:extLst>
+          </a:blip>
+          <a:srcRect t="11765" r="1264" b="26536"/>
+          <a:stretch/>
+        </p:blipFill>
+        <p:spPr>
+          <a:xfrm>
+            <a:off x="139917" y="2261533"/>
+            <a:ext cx="3125235" cy="4231342"/>
+          </a:xfrm>
+          <a:prstGeom prst="rect">
+            <a:avLst/>
+          </a:prstGeom>
+        </p:spPr>
+      </p:pic>
+      <p:pic>
+        <p:nvPicPr>
+          <p:cNvPr id="13" name="Picture 12">
+            <a:extLst>
+              <a:ext uri="{FF2B5EF4-FFF2-40B4-BE49-F238E27FC236}">
+                <a16:creationId xmlns:a16="http://schemas.microsoft.com/office/drawing/2014/main" id="{0712474F-16CF-3CB4-258A-6C0D3F112ACD}"/>
+              </a:ext>
+            </a:extLst>
+          </p:cNvPr>
+          <p:cNvPicPr>
+            <a:picLocks noChangeAspect="1"/>
+          </p:cNvPicPr>
+          <p:nvPr/>
+        </p:nvPicPr>
+        <p:blipFill rotWithShape="1">
+          <a:blip r:embed="rId4">
+            <a:extLst>
+              <a:ext uri="{28A0092B-C50C-407E-A947-70E740481C1C}">
+                <a14:useLocalDpi xmlns:a14="http://schemas.microsoft.com/office/drawing/2010/main" val="0"/>
+              </a:ext>
+            </a:extLst>
+          </a:blip>
+          <a:srcRect t="10850" b="40914"/>
+          <a:stretch/>
+        </p:blipFill>
+        <p:spPr>
+          <a:xfrm>
+            <a:off x="3428657" y="3184899"/>
+            <a:ext cx="3165231" cy="3307976"/>
+          </a:xfrm>
+          <a:prstGeom prst="rect">
+            <a:avLst/>
+          </a:prstGeom>
         </p:spPr>
       </p:pic>
     </p:spTree>
@@ -4369,46 +4435,64 @@
           <a:chExt cx="0" cy="0"/>
         </a:xfrm>
       </p:grpSpPr>
-      <p:pic>
-        <p:nvPicPr>
-          <p:cNvPr id="3" name="Picture 2">
-            <a:extLst>
-              <a:ext uri="{FF2B5EF4-FFF2-40B4-BE49-F238E27FC236}">
-                <a16:creationId xmlns:a16="http://schemas.microsoft.com/office/drawing/2014/main" id="{5EC93A28-0A42-FE16-915F-1E3F6DB41404}"/>
-              </a:ext>
-            </a:extLst>
-          </p:cNvPr>
-          <p:cNvPicPr>
-            <a:picLocks noChangeAspect="1"/>
-          </p:cNvPicPr>
+      <p:sp>
+        <p:nvSpPr>
+          <p:cNvPr id="2" name="TextBox 1">
+            <a:extLst>
+              <a:ext uri="{FF2B5EF4-FFF2-40B4-BE49-F238E27FC236}">
+                <a16:creationId xmlns:a16="http://schemas.microsoft.com/office/drawing/2014/main" id="{550D8BBA-81C6-CDE3-5A07-FD22F1DB1768}"/>
+              </a:ext>
+            </a:extLst>
+          </p:cNvPr>
+          <p:cNvSpPr txBox="1"/>
           <p:nvPr/>
-        </p:nvPicPr>
-        <p:blipFill>
-          <a:blip r:embed="rId2">
-            <a:extLst>
-              <a:ext uri="{28A0092B-C50C-407E-A947-70E740481C1C}">
-                <a14:useLocalDpi xmlns:a14="http://schemas.microsoft.com/office/drawing/2010/main" val="0"/>
-              </a:ext>
-            </a:extLst>
-          </a:blip>
-          <a:stretch>
-            <a:fillRect/>
-          </a:stretch>
-        </p:blipFill>
+        </p:nvSpPr>
         <p:spPr>
           <a:xfrm>
-            <a:off x="0" y="0"/>
-            <a:ext cx="12192000" cy="6858000"/>
+            <a:off x="2196353" y="1470212"/>
+            <a:ext cx="7377953" cy="2185214"/>
           </a:xfrm>
           <a:prstGeom prst="rect">
             <a:avLst/>
           </a:prstGeom>
+          <a:noFill/>
         </p:spPr>
-      </p:pic>
+        <p:txBody>
+          <a:bodyPr wrap="square" rtlCol="0">
+            <a:spAutoFit/>
+          </a:bodyPr>
+          <a:lstStyle/>
+          <a:p>
+            <a:pPr algn="ctr"/>
+            <a:r>
+              <a:rPr lang="en-US" sz="4000" dirty="0"/>
+              <a:t>Snapshots of the Project</a:t>
+            </a:r>
+          </a:p>
+          <a:p>
+            <a:pPr algn="ctr"/>
+            <a:endParaRPr lang="en-US" sz="4000" dirty="0"/>
+          </a:p>
+          <a:p>
+            <a:pPr algn="ctr"/>
+            <a:r>
+              <a:rPr lang="en-IN" sz="2800" dirty="0"/>
+              <a:t>PRODUCT AUTHENTICATION </a:t>
+            </a:r>
+            <a:br>
+              <a:rPr lang="en-IN" sz="2800" dirty="0"/>
+            </a:br>
+            <a:r>
+              <a:rPr lang="en-IN" sz="2800" dirty="0"/>
+              <a:t>USING BLOCKCHAIN</a:t>
+            </a:r>
+          </a:p>
+        </p:txBody>
+      </p:sp>
     </p:spTree>
     <p:extLst>
       <p:ext uri="{BB962C8B-B14F-4D97-AF65-F5344CB8AC3E}">
-        <p14:creationId xmlns:p14="http://schemas.microsoft.com/office/powerpoint/2010/main" val="3132877455"/>
+        <p14:creationId xmlns:p14="http://schemas.microsoft.com/office/powerpoint/2010/main" val="2788808559"/>
       </p:ext>
     </p:extLst>
   </p:cSld>
@@ -4440,7 +4524,7 @@
           <p:cNvPr id="3" name="Picture 2">
             <a:extLst>
               <a:ext uri="{FF2B5EF4-FFF2-40B4-BE49-F238E27FC236}">
-                <a16:creationId xmlns:a16="http://schemas.microsoft.com/office/drawing/2014/main" id="{3792B50E-0592-5FC5-F81D-7563E7063E14}"/>
+                <a16:creationId xmlns:a16="http://schemas.microsoft.com/office/drawing/2014/main" id="{5EC93A28-0A42-FE16-915F-1E3F6DB41404}"/>
               </a:ext>
             </a:extLst>
           </p:cNvPr>
@@ -4474,7 +4558,7 @@
     </p:spTree>
     <p:extLst>
       <p:ext uri="{BB962C8B-B14F-4D97-AF65-F5344CB8AC3E}">
-        <p14:creationId xmlns:p14="http://schemas.microsoft.com/office/powerpoint/2010/main" val="3071560829"/>
+        <p14:creationId xmlns:p14="http://schemas.microsoft.com/office/powerpoint/2010/main" val="3132877455"/>
       </p:ext>
     </p:extLst>
   </p:cSld>
@@ -4506,7 +4590,7 @@
           <p:cNvPr id="3" name="Picture 2">
             <a:extLst>
               <a:ext uri="{FF2B5EF4-FFF2-40B4-BE49-F238E27FC236}">
-                <a16:creationId xmlns:a16="http://schemas.microsoft.com/office/drawing/2014/main" id="{EEE8D587-CDA0-746E-66F2-AD311F18A311}"/>
+                <a16:creationId xmlns:a16="http://schemas.microsoft.com/office/drawing/2014/main" id="{3792B50E-0592-5FC5-F81D-7563E7063E14}"/>
               </a:ext>
             </a:extLst>
           </p:cNvPr>
@@ -4540,7 +4624,7 @@
     </p:spTree>
     <p:extLst>
       <p:ext uri="{BB962C8B-B14F-4D97-AF65-F5344CB8AC3E}">
-        <p14:creationId xmlns:p14="http://schemas.microsoft.com/office/powerpoint/2010/main" val="2700361713"/>
+        <p14:creationId xmlns:p14="http://schemas.microsoft.com/office/powerpoint/2010/main" val="3071560829"/>
       </p:ext>
     </p:extLst>
   </p:cSld>
@@ -4572,7 +4656,7 @@
           <p:cNvPr id="3" name="Picture 2">
             <a:extLst>
               <a:ext uri="{FF2B5EF4-FFF2-40B4-BE49-F238E27FC236}">
-                <a16:creationId xmlns:a16="http://schemas.microsoft.com/office/drawing/2014/main" id="{2306342A-7FA8-F4FE-CD9C-1591774C31B7}"/>
+                <a16:creationId xmlns:a16="http://schemas.microsoft.com/office/drawing/2014/main" id="{EEE8D587-CDA0-746E-66F2-AD311F18A311}"/>
               </a:ext>
             </a:extLst>
           </p:cNvPr>
@@ -4606,7 +4690,7 @@
     </p:spTree>
     <p:extLst>
       <p:ext uri="{BB962C8B-B14F-4D97-AF65-F5344CB8AC3E}">
-        <p14:creationId xmlns:p14="http://schemas.microsoft.com/office/powerpoint/2010/main" val="8600510"/>
+        <p14:creationId xmlns:p14="http://schemas.microsoft.com/office/powerpoint/2010/main" val="2700361713"/>
       </p:ext>
     </p:extLst>
   </p:cSld>
@@ -4638,7 +4722,7 @@
           <p:cNvPr id="3" name="Picture 2">
             <a:extLst>
               <a:ext uri="{FF2B5EF4-FFF2-40B4-BE49-F238E27FC236}">
-                <a16:creationId xmlns:a16="http://schemas.microsoft.com/office/drawing/2014/main" id="{05B3D466-E4B9-2219-F198-E65B6BB3CDCC}"/>
+                <a16:creationId xmlns:a16="http://schemas.microsoft.com/office/drawing/2014/main" id="{2306342A-7FA8-F4FE-CD9C-1591774C31B7}"/>
               </a:ext>
             </a:extLst>
           </p:cNvPr>
@@ -4672,7 +4756,7 @@
     </p:spTree>
     <p:extLst>
       <p:ext uri="{BB962C8B-B14F-4D97-AF65-F5344CB8AC3E}">
-        <p14:creationId xmlns:p14="http://schemas.microsoft.com/office/powerpoint/2010/main" val="3161852090"/>
+        <p14:creationId xmlns:p14="http://schemas.microsoft.com/office/powerpoint/2010/main" val="8600510"/>
       </p:ext>
     </p:extLst>
   </p:cSld>
@@ -4704,6 +4788,72 @@
           <p:cNvPr id="3" name="Picture 2">
             <a:extLst>
               <a:ext uri="{FF2B5EF4-FFF2-40B4-BE49-F238E27FC236}">
+                <a16:creationId xmlns:a16="http://schemas.microsoft.com/office/drawing/2014/main" id="{05B3D466-E4B9-2219-F198-E65B6BB3CDCC}"/>
+              </a:ext>
+            </a:extLst>
+          </p:cNvPr>
+          <p:cNvPicPr>
+            <a:picLocks noChangeAspect="1"/>
+          </p:cNvPicPr>
+          <p:nvPr/>
+        </p:nvPicPr>
+        <p:blipFill>
+          <a:blip r:embed="rId2">
+            <a:extLst>
+              <a:ext uri="{28A0092B-C50C-407E-A947-70E740481C1C}">
+                <a14:useLocalDpi xmlns:a14="http://schemas.microsoft.com/office/drawing/2010/main" val="0"/>
+              </a:ext>
+            </a:extLst>
+          </a:blip>
+          <a:stretch>
+            <a:fillRect/>
+          </a:stretch>
+        </p:blipFill>
+        <p:spPr>
+          <a:xfrm>
+            <a:off x="0" y="0"/>
+            <a:ext cx="12192000" cy="6858000"/>
+          </a:xfrm>
+          <a:prstGeom prst="rect">
+            <a:avLst/>
+          </a:prstGeom>
+        </p:spPr>
+      </p:pic>
+    </p:spTree>
+    <p:extLst>
+      <p:ext uri="{BB962C8B-B14F-4D97-AF65-F5344CB8AC3E}">
+        <p14:creationId xmlns:p14="http://schemas.microsoft.com/office/powerpoint/2010/main" val="3161852090"/>
+      </p:ext>
+    </p:extLst>
+  </p:cSld>
+  <p:clrMapOvr>
+    <a:masterClrMapping/>
+  </p:clrMapOvr>
+</p:sld>
+</file>
+
+<file path=ppt/slides/slide17.xml><?xml version="1.0" encoding="utf-8"?>
+<p:sld xmlns:a="http://schemas.openxmlformats.org/drawingml/2006/main" xmlns:r="http://schemas.openxmlformats.org/officeDocument/2006/relationships" xmlns:p="http://schemas.openxmlformats.org/presentationml/2006/main">
+  <p:cSld>
+    <p:spTree>
+      <p:nvGrpSpPr>
+        <p:cNvPr id="1" name=""/>
+        <p:cNvGrpSpPr/>
+        <p:nvPr/>
+      </p:nvGrpSpPr>
+      <p:grpSpPr>
+        <a:xfrm>
+          <a:off x="0" y="0"/>
+          <a:ext cx="0" cy="0"/>
+          <a:chOff x="0" y="0"/>
+          <a:chExt cx="0" cy="0"/>
+        </a:xfrm>
+      </p:grpSpPr>
+      <p:pic>
+        <p:nvPicPr>
+          <p:cNvPr id="3" name="Picture 2">
+            <a:extLst>
+              <a:ext uri="{FF2B5EF4-FFF2-40B4-BE49-F238E27FC236}">
                 <a16:creationId xmlns:a16="http://schemas.microsoft.com/office/drawing/2014/main" id="{6A07BE55-B9F2-EBCF-F277-40F45AAB3114}"/>
               </a:ext>
             </a:extLst>
@@ -4739,6 +4889,206 @@
     <p:extLst>
       <p:ext uri="{BB962C8B-B14F-4D97-AF65-F5344CB8AC3E}">
         <p14:creationId xmlns:p14="http://schemas.microsoft.com/office/powerpoint/2010/main" val="4100498570"/>
+      </p:ext>
+    </p:extLst>
+  </p:cSld>
+  <p:clrMapOvr>
+    <a:masterClrMapping/>
+  </p:clrMapOvr>
+</p:sld>
+</file>
+
+<file path=ppt/slides/slide18.xml><?xml version="1.0" encoding="utf-8"?>
+<p:sld xmlns:a="http://schemas.openxmlformats.org/drawingml/2006/main" xmlns:r="http://schemas.openxmlformats.org/officeDocument/2006/relationships" xmlns:p="http://schemas.openxmlformats.org/presentationml/2006/main">
+  <p:cSld>
+    <p:spTree>
+      <p:nvGrpSpPr>
+        <p:cNvPr id="1" name=""/>
+        <p:cNvGrpSpPr/>
+        <p:nvPr/>
+      </p:nvGrpSpPr>
+      <p:grpSpPr>
+        <a:xfrm>
+          <a:off x="0" y="0"/>
+          <a:ext cx="0" cy="0"/>
+          <a:chOff x="0" y="0"/>
+          <a:chExt cx="0" cy="0"/>
+        </a:xfrm>
+      </p:grpSpPr>
+      <p:sp>
+        <p:nvSpPr>
+          <p:cNvPr id="2" name="TextBox 1">
+            <a:extLst>
+              <a:ext uri="{FF2B5EF4-FFF2-40B4-BE49-F238E27FC236}">
+                <a16:creationId xmlns:a16="http://schemas.microsoft.com/office/drawing/2014/main" id="{1AE231DC-820E-6BC1-B604-3A9A845F4A43}"/>
+              </a:ext>
+            </a:extLst>
+          </p:cNvPr>
+          <p:cNvSpPr txBox="1"/>
+          <p:nvPr/>
+        </p:nvSpPr>
+        <p:spPr>
+          <a:xfrm>
+            <a:off x="3043517" y="2339788"/>
+            <a:ext cx="6104965" cy="707886"/>
+          </a:xfrm>
+          <a:prstGeom prst="rect">
+            <a:avLst/>
+          </a:prstGeom>
+          <a:noFill/>
+        </p:spPr>
+        <p:txBody>
+          <a:bodyPr wrap="square" rtlCol="0">
+            <a:spAutoFit/>
+          </a:bodyPr>
+          <a:lstStyle/>
+          <a:p>
+            <a:pPr algn="ctr"/>
+            <a:r>
+              <a:rPr lang="en-US" sz="4000" dirty="0"/>
+              <a:t>THANK YOU</a:t>
+            </a:r>
+            <a:endParaRPr lang="en-IN" sz="4000" dirty="0"/>
+          </a:p>
+        </p:txBody>
+      </p:sp>
+      <p:sp>
+        <p:nvSpPr>
+          <p:cNvPr id="4" name="TextBox 3">
+            <a:extLst>
+              <a:ext uri="{FF2B5EF4-FFF2-40B4-BE49-F238E27FC236}">
+                <a16:creationId xmlns:a16="http://schemas.microsoft.com/office/drawing/2014/main" id="{0B842B72-EFF1-F775-9081-2D195856B41D}"/>
+              </a:ext>
+            </a:extLst>
+          </p:cNvPr>
+          <p:cNvSpPr txBox="1"/>
+          <p:nvPr/>
+        </p:nvSpPr>
+        <p:spPr>
+          <a:xfrm>
+            <a:off x="5925670" y="4923456"/>
+            <a:ext cx="6096000" cy="2031325"/>
+          </a:xfrm>
+          <a:prstGeom prst="rect">
+            <a:avLst/>
+          </a:prstGeom>
+          <a:noFill/>
+        </p:spPr>
+        <p:txBody>
+          <a:bodyPr wrap="square">
+            <a:spAutoFit/>
+          </a:bodyPr>
+          <a:lstStyle/>
+          <a:p>
+            <a:pPr algn="r"/>
+            <a:r>
+              <a:rPr lang="en-IN" sz="1800" b="1" dirty="0"/>
+              <a:t>Guide Name</a:t>
+            </a:r>
+            <a:r>
+              <a:rPr lang="en-IN" sz="1800" dirty="0"/>
+              <a:t>: Ms. Shivani</a:t>
+            </a:r>
+          </a:p>
+          <a:p>
+            <a:pPr algn="r"/>
+            <a:r>
+              <a:rPr lang="en-IN" sz="1800" dirty="0"/>
+              <a:t>				</a:t>
+            </a:r>
+            <a:r>
+              <a:rPr lang="en-IN" sz="1800" b="1" dirty="0"/>
+              <a:t>Project Members</a:t>
+            </a:r>
+          </a:p>
+          <a:p>
+            <a:pPr algn="r"/>
+            <a:r>
+              <a:rPr lang="en-IN" sz="1800" dirty="0"/>
+              <a:t>Abhishek Singh Yadav (2000290120011), CS-7A</a:t>
+            </a:r>
+          </a:p>
+          <a:p>
+            <a:pPr algn="r"/>
+            <a:r>
+              <a:rPr lang="en-IN" sz="1800" dirty="0"/>
+              <a:t>Aditi Batra (2000290120012), CS-7A</a:t>
+            </a:r>
+          </a:p>
+          <a:p>
+            <a:pPr algn="r"/>
+            <a:r>
+              <a:rPr lang="en-IN" sz="1800" dirty="0"/>
+              <a:t>Anurag Tripathi (2000290120036), CS-7A</a:t>
+            </a:r>
+          </a:p>
+          <a:p>
+            <a:pPr algn="r"/>
+            <a:r>
+              <a:rPr lang="en-IN" sz="1800" dirty="0" err="1"/>
+              <a:t>Kshitij</a:t>
+            </a:r>
+            <a:r>
+              <a:rPr lang="en-IN" sz="1800" dirty="0"/>
+              <a:t> Pal (2000290310092), ECE-7B</a:t>
+            </a:r>
+          </a:p>
+          <a:p>
+            <a:endParaRPr lang="en-IN" dirty="0"/>
+          </a:p>
+        </p:txBody>
+      </p:sp>
+      <p:pic>
+        <p:nvPicPr>
+          <p:cNvPr id="5" name="Picture 1170367094" descr="A close-up of a stamp  Description automatically generated with low confidence">
+            <a:extLst>
+              <a:ext uri="{FF2B5EF4-FFF2-40B4-BE49-F238E27FC236}">
+                <a16:creationId xmlns:a16="http://schemas.microsoft.com/office/drawing/2014/main" id="{05DC800A-ABC8-BB0D-17CB-4E2DE32EDA9E}"/>
+              </a:ext>
+            </a:extLst>
+          </p:cNvPr>
+          <p:cNvPicPr>
+            <a:picLocks noChangeAspect="1" noChangeArrowheads="1"/>
+          </p:cNvPicPr>
+          <p:nvPr/>
+        </p:nvPicPr>
+        <p:blipFill>
+          <a:blip r:embed="rId2">
+            <a:extLst>
+              <a:ext uri="{28A0092B-C50C-407E-A947-70E740481C1C}">
+                <a14:useLocalDpi xmlns:a14="http://schemas.microsoft.com/office/drawing/2010/main" val="0"/>
+              </a:ext>
+            </a:extLst>
+          </a:blip>
+          <a:srcRect/>
+          <a:stretch>
+            <a:fillRect/>
+          </a:stretch>
+        </p:blipFill>
+        <p:spPr bwMode="auto">
+          <a:xfrm>
+            <a:off x="98954" y="107687"/>
+            <a:ext cx="1367367" cy="1246715"/>
+          </a:xfrm>
+          <a:prstGeom prst="rect">
+            <a:avLst/>
+          </a:prstGeom>
+          <a:noFill/>
+          <a:extLst>
+            <a:ext uri="{909E8E84-426E-40DD-AFC4-6F175D3DCCD1}">
+              <a14:hiddenFill xmlns:a14="http://schemas.microsoft.com/office/drawing/2010/main">
+                <a:solidFill>
+                  <a:srgbClr val="FFFFFF"/>
+                </a:solidFill>
+              </a14:hiddenFill>
+            </a:ext>
+          </a:extLst>
+        </p:spPr>
+      </p:pic>
+    </p:spTree>
+    <p:extLst>
+      <p:ext uri="{BB962C8B-B14F-4D97-AF65-F5344CB8AC3E}">
+        <p14:creationId xmlns:p14="http://schemas.microsoft.com/office/powerpoint/2010/main" val="2013468690"/>
       </p:ext>
     </p:extLst>
   </p:cSld>
@@ -4918,7 +5268,12 @@
             <p:ph type="title"/>
           </p:nvPr>
         </p:nvSpPr>
-        <p:spPr/>
+        <p:spPr>
+          <a:xfrm>
+            <a:off x="838200" y="500062"/>
+            <a:ext cx="10515600" cy="1325563"/>
+          </a:xfrm>
+        </p:spPr>
         <p:txBody>
           <a:bodyPr/>
           <a:lstStyle/>
@@ -5301,12 +5656,14 @@
           <a:p>
             <a:r>
               <a:rPr lang="en-US" dirty="0">
-                <a:latin typeface="Cooper Black" panose="0208090404030B020404" pitchFamily="18" charset="0"/>
+                <a:ea typeface="Calibri Light" panose="020F0302020204030204" pitchFamily="34" charset="0"/>
+                <a:cs typeface="Calibri Light" panose="020F0302020204030204" pitchFamily="34" charset="0"/>
               </a:rPr>
               <a:t>LITERATURE SURVEY</a:t>
             </a:r>
             <a:endParaRPr lang="en-IN" dirty="0">
-              <a:latin typeface="Cooper Black" panose="0208090404030B020404" pitchFamily="18" charset="0"/>
+              <a:ea typeface="Calibri Light" panose="020F0302020204030204" pitchFamily="34" charset="0"/>
+              <a:cs typeface="Calibri Light" panose="020F0302020204030204" pitchFamily="34" charset="0"/>
             </a:endParaRPr>
           </a:p>
         </p:txBody>
@@ -5335,16 +5692,99 @@
         </p:spPr>
         <p:txBody>
           <a:bodyPr>
-            <a:normAutofit fontScale="70000" lnSpcReduction="20000"/>
+            <a:normAutofit fontScale="77500" lnSpcReduction="20000"/>
           </a:bodyPr>
           <a:lstStyle/>
           <a:p>
-            <a:pPr marL="457200" indent="-457200">
-              <a:buAutoNum type="arabicPeriod"/>
+            <a:pPr>
+              <a:buFont typeface="Wingdings" panose="05000000000000000000" pitchFamily="2" charset="2"/>
+              <a:buChar char="Ø"/>
             </a:pPr>
             <a:r>
               <a:rPr lang="en-US" dirty="0"/>
-              <a:t>Blockchain Adoption for Combating Deceptive Counterfeits</a:t>
+              <a:t>An Overview of Blockchain Technology: Architecture, Consensus, and Future Trends</a:t>
+            </a:r>
+          </a:p>
+          <a:p>
+            <a:r>
+              <a:rPr lang="en-US" dirty="0"/>
+              <a:t> Authors: </a:t>
+            </a:r>
+            <a:r>
+              <a:rPr lang="de-DE" dirty="0"/>
+              <a:t>Z. Zheng, S. Xie, H. Dai, X. Chen, and H. Wang</a:t>
+            </a:r>
+            <a:endParaRPr lang="en-US" dirty="0"/>
+          </a:p>
+          <a:p>
+            <a:r>
+              <a:rPr lang="en-US" dirty="0"/>
+              <a:t> Year: 2017</a:t>
+            </a:r>
+          </a:p>
+          <a:p>
+            <a:pPr marL="0" indent="0">
+              <a:buNone/>
+            </a:pPr>
+            <a:endParaRPr lang="en-US" dirty="0"/>
+          </a:p>
+          <a:p>
+            <a:pPr>
+              <a:buFont typeface="Wingdings" panose="05000000000000000000" pitchFamily="2" charset="2"/>
+              <a:buChar char="Ø"/>
+            </a:pPr>
+            <a:r>
+              <a:rPr lang="en-US" dirty="0"/>
+              <a:t>Hyperledger, Ethereum and Blockchain Technology: A Short Overview</a:t>
+            </a:r>
+            <a:endParaRPr lang="en-IN" dirty="0"/>
+          </a:p>
+          <a:p>
+            <a:r>
+              <a:rPr lang="en-IN" dirty="0"/>
+              <a:t>Authors: </a:t>
+            </a:r>
+            <a:r>
+              <a:rPr lang="en-US" dirty="0"/>
+              <a:t>A.H. Mohammed, A. A. </a:t>
+            </a:r>
+            <a:r>
+              <a:rPr lang="en-US" dirty="0" err="1"/>
+              <a:t>Abdulateef</a:t>
+            </a:r>
+            <a:r>
+              <a:rPr lang="en-US" dirty="0"/>
+              <a:t> and I. A. </a:t>
+            </a:r>
+            <a:r>
+              <a:rPr lang="en-US" dirty="0" err="1"/>
+              <a:t>Abdulateef</a:t>
+            </a:r>
+            <a:r>
+              <a:rPr lang="en-US" dirty="0"/>
+              <a:t>, </a:t>
+            </a:r>
+          </a:p>
+          <a:p>
+            <a:r>
+              <a:rPr lang="en-IN" dirty="0"/>
+              <a:t>Year: 2021</a:t>
+            </a:r>
+          </a:p>
+          <a:p>
+            <a:pPr marL="0" indent="0">
+              <a:buNone/>
+            </a:pPr>
+            <a:endParaRPr lang="en-IN" dirty="0"/>
+          </a:p>
+          <a:p>
+            <a:pPr>
+              <a:buFont typeface="Wingdings" panose="05000000000000000000" pitchFamily="2" charset="2"/>
+              <a:buChar char="Ø"/>
+            </a:pPr>
+            <a:r>
+              <a:rPr lang="en-US" dirty="0"/>
+              <a:t>Blockchain-Enabled Smart Contracts: Architecture, Applications, and Future Trends</a:t>
             </a:r>
           </a:p>
           <a:p>
@@ -5353,147 +5793,15 @@
               <a:t>Authors: </a:t>
             </a:r>
             <a:r>
-              <a:rPr lang="en-IN" dirty="0"/>
-              <a:t>Hubert Pun</a:t>
-            </a:r>
+              <a:rPr lang="sv-SE" dirty="0"/>
+              <a:t>S. Wang, L. Ouyang, Y. Yuan, X. Ni, X. Han and F.-Y. Wang</a:t>
+            </a:r>
+            <a:endParaRPr lang="en-US" dirty="0"/>
+          </a:p>
+          <a:p>
             <a:r>
               <a:rPr lang="en-US" dirty="0"/>
-              <a:t>, </a:t>
-            </a:r>
-            <a:r>
-              <a:rPr lang="en-IN" dirty="0" err="1"/>
-              <a:t>Jayashankar</a:t>
-            </a:r>
-            <a:r>
-              <a:rPr lang="en-IN" dirty="0"/>
-              <a:t> M. Swaminathan</a:t>
-            </a:r>
-            <a:r>
-              <a:rPr lang="en-US" dirty="0"/>
-              <a:t>, </a:t>
-            </a:r>
-            <a:r>
-              <a:rPr lang="en-IN" dirty="0" err="1"/>
-              <a:t>Pengwen</a:t>
-            </a:r>
-            <a:r>
-              <a:rPr lang="en-IN" dirty="0"/>
-              <a:t> Hou</a:t>
-            </a:r>
-            <a:endParaRPr lang="en-US" dirty="0"/>
-          </a:p>
-          <a:p>
-            <a:r>
-              <a:rPr lang="en-US" dirty="0"/>
-              <a:t>Year: 2021</a:t>
-            </a:r>
-          </a:p>
-          <a:p>
-            <a:pPr marL="0" indent="0">
-              <a:buNone/>
-            </a:pPr>
-            <a:endParaRPr lang="en-US" dirty="0"/>
-          </a:p>
-          <a:p>
-            <a:pPr marL="0" indent="0">
-              <a:buNone/>
-            </a:pPr>
-            <a:r>
-              <a:rPr lang="en-US" dirty="0"/>
-              <a:t>2. </a:t>
-            </a:r>
-            <a:r>
-              <a:rPr lang="en-IN" dirty="0"/>
-              <a:t>A </a:t>
-            </a:r>
-            <a:r>
-              <a:rPr lang="en-IN" dirty="0" err="1"/>
-              <a:t>NewProducts’Anti-CounterfeitingBlockchain</a:t>
-            </a:r>
-            <a:r>
-              <a:rPr lang="en-IN" dirty="0"/>
-              <a:t> Using a Truly Decentralized, Dynamic Consensus Protocol</a:t>
-            </a:r>
-          </a:p>
-          <a:p>
-            <a:r>
-              <a:rPr lang="en-IN" dirty="0"/>
-              <a:t>Authors: Naif </a:t>
-            </a:r>
-            <a:r>
-              <a:rPr lang="en-IN" dirty="0" err="1"/>
-              <a:t>Alzahrani</a:t>
-            </a:r>
-            <a:r>
-              <a:rPr lang="en-IN" dirty="0"/>
-              <a:t>, Nirupama </a:t>
-            </a:r>
-            <a:r>
-              <a:rPr lang="en-IN" dirty="0" err="1"/>
-              <a:t>Bulusu</a:t>
-            </a:r>
-            <a:endParaRPr lang="en-IN" dirty="0"/>
-          </a:p>
-          <a:p>
-            <a:r>
-              <a:rPr lang="en-IN" dirty="0"/>
               <a:t>Year: 2019</a:t>
-            </a:r>
-          </a:p>
-          <a:p>
-            <a:pPr marL="0" indent="0">
-              <a:buNone/>
-            </a:pPr>
-            <a:endParaRPr lang="en-IN" dirty="0"/>
-          </a:p>
-          <a:p>
-            <a:pPr marL="0" indent="0">
-              <a:buNone/>
-            </a:pPr>
-            <a:r>
-              <a:rPr lang="en-IN" dirty="0"/>
-              <a:t>3.</a:t>
-            </a:r>
-            <a:r>
-              <a:rPr lang="en-US" dirty="0"/>
-              <a:t> Product Authentication Technology Integrating Blockchain and Traceability Structure</a:t>
-            </a:r>
-          </a:p>
-          <a:p>
-            <a:r>
-              <a:rPr lang="en-US" dirty="0"/>
-              <a:t>Authors: </a:t>
-            </a:r>
-            <a:r>
-              <a:rPr lang="en-IN" dirty="0"/>
-              <a:t>Xiao Gao, </a:t>
-            </a:r>
-            <a:r>
-              <a:rPr lang="en-IN" dirty="0" err="1"/>
-              <a:t>Wenyin</a:t>
-            </a:r>
-            <a:r>
-              <a:rPr lang="en-IN" dirty="0"/>
-              <a:t> Zhang, </a:t>
-            </a:r>
-            <a:r>
-              <a:rPr lang="en-IN" dirty="0" err="1"/>
-              <a:t>Jiqun</a:t>
-            </a:r>
-            <a:r>
-              <a:rPr lang="en-IN" dirty="0"/>
-              <a:t> Zhang, </a:t>
-            </a:r>
-            <a:r>
-              <a:rPr lang="en-IN" dirty="0" err="1"/>
-              <a:t>YilongGao</a:t>
-            </a:r>
-            <a:endParaRPr lang="en-US" dirty="0"/>
-          </a:p>
-          <a:p>
-            <a:r>
-              <a:rPr lang="en-US" dirty="0"/>
-              <a:t>Year: 2022</a:t>
             </a:r>
             <a:endParaRPr lang="en-IN" dirty="0"/>
           </a:p>
@@ -5553,18 +5861,16 @@
         </p:nvSpPr>
         <p:spPr/>
         <p:txBody>
-          <a:bodyPr/>
-          <a:lstStyle/>
-          <a:p>
-            <a:r>
-              <a:rPr lang="en-US" dirty="0">
-                <a:latin typeface="Cooper Black" panose="0208090404030B020404" pitchFamily="18" charset="0"/>
-              </a:rPr>
+          <a:bodyPr>
+            <a:normAutofit/>
+          </a:bodyPr>
+          <a:lstStyle/>
+          <a:p>
+            <a:r>
+              <a:rPr lang="en-US" sz="4000" dirty="0"/>
               <a:t>LITERATURE SURVEY</a:t>
             </a:r>
-            <a:endParaRPr lang="en-IN" dirty="0">
-              <a:latin typeface="Cooper Black" panose="0208090404030B020404" pitchFamily="18" charset="0"/>
-            </a:endParaRPr>
+            <a:endParaRPr lang="en-IN" sz="4000" dirty="0"/>
           </a:p>
         </p:txBody>
       </p:sp>
@@ -5596,59 +5902,26 @@
           </a:bodyPr>
           <a:lstStyle/>
           <a:p>
-            <a:pPr marL="0" indent="0">
-              <a:buNone/>
+            <a:pPr>
+              <a:buFont typeface="Wingdings" panose="05000000000000000000" pitchFamily="2" charset="2"/>
+              <a:buChar char="Ø"/>
             </a:pPr>
             <a:r>
+              <a:rPr lang="en-US" sz="2000" dirty="0"/>
+              <a:t>A Journey of WEB and Blockchain towards Industry 4.0: An Overview</a:t>
+            </a:r>
+            <a:endParaRPr lang="en-IN" sz="2000" dirty="0"/>
+          </a:p>
+          <a:p>
+            <a:r>
               <a:rPr lang="en-IN" sz="2000" dirty="0"/>
-              <a:t>4</a:t>
-            </a:r>
-            <a:r>
-              <a:rPr lang="en-IN" dirty="0"/>
-              <a:t>. </a:t>
-            </a:r>
+              <a:t>Authors: AG. Khan, A. H. Zahid, M. Hussain, M. Farooq, U. Riaz and T. M. Alam</a:t>
+            </a:r>
+          </a:p>
+          <a:p>
             <a:r>
               <a:rPr lang="en-IN" sz="2000" dirty="0"/>
-              <a:t>Detection of counterfeit products using Blockchain</a:t>
-            </a:r>
-          </a:p>
-          <a:p>
-            <a:pPr marL="0" indent="0">
-              <a:buNone/>
-            </a:pPr>
-            <a:r>
-              <a:rPr lang="en-IN" sz="2000" dirty="0"/>
-              <a:t>Authors: Kunal Wasnik ,Isha </a:t>
-            </a:r>
-            <a:r>
-              <a:rPr lang="en-IN" sz="2000" dirty="0" err="1"/>
-              <a:t>Sondawle</a:t>
-            </a:r>
-            <a:r>
-              <a:rPr lang="en-IN" sz="2000" dirty="0"/>
-              <a:t>, </a:t>
-            </a:r>
-            <a:r>
-              <a:rPr lang="en-IN" sz="2000" dirty="0" err="1"/>
-              <a:t>Rushikesh</a:t>
-            </a:r>
-            <a:r>
-              <a:rPr lang="en-IN" sz="2000" dirty="0"/>
-              <a:t> Wani, Namita </a:t>
-            </a:r>
-            <a:r>
-              <a:rPr lang="en-IN" sz="2000" dirty="0" err="1"/>
-              <a:t>Pulgam</a:t>
-            </a:r>
-            <a:endParaRPr lang="en-IN" sz="2000" dirty="0"/>
-          </a:p>
-          <a:p>
-            <a:pPr marL="0" indent="0">
-              <a:buNone/>
-            </a:pPr>
-            <a:r>
-              <a:rPr lang="en-IN" sz="2000" dirty="0"/>
-              <a:t>Year: 2022</a:t>
+              <a:t>Year: 2019</a:t>
             </a:r>
           </a:p>
           <a:p>
@@ -5658,47 +5931,41 @@
             <a:endParaRPr lang="en-IN" sz="2000" dirty="0"/>
           </a:p>
           <a:p>
-            <a:pPr marL="0" indent="0">
-              <a:buNone/>
+            <a:pPr>
+              <a:buFont typeface="Wingdings" panose="05000000000000000000" pitchFamily="2" charset="2"/>
+              <a:buChar char="Ø"/>
             </a:pPr>
             <a:r>
-              <a:rPr lang="en-IN" sz="2000" dirty="0"/>
-              <a:t>5. </a:t>
-            </a:r>
-            <a:r>
               <a:rPr lang="en-US" sz="2000" dirty="0"/>
-              <a:t>A Blockchain-Based Application System for Product Anti-Counterfeiting</a:t>
-            </a:r>
-          </a:p>
-          <a:p>
-            <a:pPr marL="0" indent="0">
-              <a:buNone/>
-            </a:pPr>
+              <a:t>Framework for Product Anti-Counterfeiting using Blockchain Technology</a:t>
+            </a:r>
+          </a:p>
+          <a:p>
             <a:r>
               <a:rPr lang="en-US" sz="2000" dirty="0"/>
-              <a:t>Authors: </a:t>
-            </a:r>
-            <a:r>
-              <a:rPr lang="en-IN" sz="2000" dirty="0"/>
-              <a:t>Jinhua Ma, Shih-Ya Lin, Xin Chen, Hung-Min Sun, </a:t>
-            </a:r>
-            <a:r>
-              <a:rPr lang="en-IN" sz="2000" dirty="0" err="1"/>
-              <a:t>Huaxiong</a:t>
-            </a:r>
-            <a:r>
-              <a:rPr lang="en-IN" sz="2000" dirty="0"/>
-              <a:t> Wang</a:t>
-            </a:r>
-            <a:endParaRPr lang="en-US" sz="2000" dirty="0"/>
-          </a:p>
-          <a:p>
-            <a:pPr marL="0" indent="0">
-              <a:buNone/>
-            </a:pPr>
+              <a:t>Authors: P. William, D. Jadhav, P. </a:t>
+            </a:r>
+            <a:r>
+              <a:rPr lang="en-US" sz="2000" dirty="0" err="1"/>
+              <a:t>Cholke</a:t>
+            </a:r>
             <a:r>
               <a:rPr lang="en-US" sz="2000" dirty="0"/>
-              <a:t>Year: 2020</a:t>
+              <a:t>, M. A. </a:t>
+            </a:r>
+            <a:r>
+              <a:rPr lang="en-US" sz="2000" dirty="0" err="1"/>
+              <a:t>Jawale</a:t>
+            </a:r>
+            <a:r>
+              <a:rPr lang="en-US" sz="2000" dirty="0"/>
+              <a:t> and A. B. Pawar</a:t>
+            </a:r>
+          </a:p>
+          <a:p>
+            <a:r>
+              <a:rPr lang="en-US" sz="2000" dirty="0"/>
+              <a:t>Year: 2022</a:t>
             </a:r>
             <a:endParaRPr lang="en-IN" sz="2000" dirty="0"/>
           </a:p>
@@ -6053,35 +6320,6 @@
           </a:p>
         </p:txBody>
       </p:sp>
-      <p:pic>
-        <p:nvPicPr>
-          <p:cNvPr id="5" name="Content Placeholder 4">
-            <a:extLst>
-              <a:ext uri="{FF2B5EF4-FFF2-40B4-BE49-F238E27FC236}">
-                <a16:creationId xmlns:a16="http://schemas.microsoft.com/office/drawing/2014/main" id="{0839E130-145F-6EB3-4372-3473F5D70E0A}"/>
-              </a:ext>
-            </a:extLst>
-          </p:cNvPr>
-          <p:cNvPicPr>
-            <a:picLocks noGrp="1" noChangeAspect="1"/>
-          </p:cNvPicPr>
-          <p:nvPr>
-            <p:ph idx="1"/>
-          </p:nvPr>
-        </p:nvPicPr>
-        <p:blipFill>
-          <a:blip r:embed="rId2"/>
-          <a:stretch>
-            <a:fillRect/>
-          </a:stretch>
-        </p:blipFill>
-        <p:spPr>
-          <a:xfrm>
-            <a:off x="6096000" y="1368425"/>
-            <a:ext cx="5337465" cy="4844538"/>
-          </a:xfrm>
-        </p:spPr>
-      </p:pic>
       <p:sp>
         <p:nvSpPr>
           <p:cNvPr id="3" name="TextBox 2">
@@ -6097,7 +6335,7 @@
         <p:spPr>
           <a:xfrm>
             <a:off x="1416425" y="2429435"/>
-            <a:ext cx="1810870" cy="369332"/>
+            <a:ext cx="1129551" cy="369332"/>
           </a:xfrm>
           <a:prstGeom prst="rect">
             <a:avLst/>
@@ -6117,12 +6355,47 @@
           <a:p>
             <a:r>
               <a:rPr lang="en-US" dirty="0"/>
-              <a:t>Payment done</a:t>
+              <a:t>Published</a:t>
             </a:r>
             <a:endParaRPr lang="en-IN" dirty="0"/>
           </a:p>
         </p:txBody>
       </p:sp>
+      <p:pic>
+        <p:nvPicPr>
+          <p:cNvPr id="8" name="Content Placeholder 7">
+            <a:extLst>
+              <a:ext uri="{FF2B5EF4-FFF2-40B4-BE49-F238E27FC236}">
+                <a16:creationId xmlns:a16="http://schemas.microsoft.com/office/drawing/2014/main" id="{96271262-A484-BAA3-E992-916F299C60BD}"/>
+              </a:ext>
+            </a:extLst>
+          </p:cNvPr>
+          <p:cNvPicPr>
+            <a:picLocks noGrp="1" noChangeAspect="1"/>
+          </p:cNvPicPr>
+          <p:nvPr>
+            <p:ph idx="1"/>
+          </p:nvPr>
+        </p:nvPicPr>
+        <p:blipFill>
+          <a:blip r:embed="rId2">
+            <a:extLst>
+              <a:ext uri="{28A0092B-C50C-407E-A947-70E740481C1C}">
+                <a14:useLocalDpi xmlns:a14="http://schemas.microsoft.com/office/drawing/2010/main" val="0"/>
+              </a:ext>
+            </a:extLst>
+          </a:blip>
+          <a:stretch>
+            <a:fillRect/>
+          </a:stretch>
+        </p:blipFill>
+        <p:spPr>
+          <a:xfrm>
+            <a:off x="3949372" y="887505"/>
+            <a:ext cx="8009449" cy="5683905"/>
+          </a:xfrm>
+        </p:spPr>
+      </p:pic>
     </p:spTree>
     <p:extLst>
       <p:ext uri="{BB962C8B-B14F-4D97-AF65-F5344CB8AC3E}">

</xml_diff>